<commit_message>
updated figure and general proof
</commit_message>
<xml_diff>
--- a/img/am-call-eur-call.pptx
+++ b/img/am-call-eur-call.pptx
@@ -259,7 +259,7 @@
           <a:p>
             <a:fld id="{43C63E5C-259F-4767-9F32-E9A25171A77E}" type="datetimeFigureOut">
               <a:rPr lang="en-US" smtClean="0"/>
-              <a:t>4/11/2021</a:t>
+              <a:t>12/22/2021</a:t>
             </a:fld>
             <a:endParaRPr lang="en-US"/>
           </a:p>
@@ -457,7 +457,7 @@
           <a:p>
             <a:fld id="{43C63E5C-259F-4767-9F32-E9A25171A77E}" type="datetimeFigureOut">
               <a:rPr lang="en-US" smtClean="0"/>
-              <a:t>4/11/2021</a:t>
+              <a:t>12/22/2021</a:t>
             </a:fld>
             <a:endParaRPr lang="en-US"/>
           </a:p>
@@ -665,7 +665,7 @@
           <a:p>
             <a:fld id="{43C63E5C-259F-4767-9F32-E9A25171A77E}" type="datetimeFigureOut">
               <a:rPr lang="en-US" smtClean="0"/>
-              <a:t>4/11/2021</a:t>
+              <a:t>12/22/2021</a:t>
             </a:fld>
             <a:endParaRPr lang="en-US"/>
           </a:p>
@@ -863,7 +863,7 @@
           <a:p>
             <a:fld id="{43C63E5C-259F-4767-9F32-E9A25171A77E}" type="datetimeFigureOut">
               <a:rPr lang="en-US" smtClean="0"/>
-              <a:t>4/11/2021</a:t>
+              <a:t>12/22/2021</a:t>
             </a:fld>
             <a:endParaRPr lang="en-US"/>
           </a:p>
@@ -1138,7 +1138,7 @@
           <a:p>
             <a:fld id="{43C63E5C-259F-4767-9F32-E9A25171A77E}" type="datetimeFigureOut">
               <a:rPr lang="en-US" smtClean="0"/>
-              <a:t>4/11/2021</a:t>
+              <a:t>12/22/2021</a:t>
             </a:fld>
             <a:endParaRPr lang="en-US"/>
           </a:p>
@@ -1403,7 +1403,7 @@
           <a:p>
             <a:fld id="{43C63E5C-259F-4767-9F32-E9A25171A77E}" type="datetimeFigureOut">
               <a:rPr lang="en-US" smtClean="0"/>
-              <a:t>4/11/2021</a:t>
+              <a:t>12/22/2021</a:t>
             </a:fld>
             <a:endParaRPr lang="en-US"/>
           </a:p>
@@ -1815,7 +1815,7 @@
           <a:p>
             <a:fld id="{43C63E5C-259F-4767-9F32-E9A25171A77E}" type="datetimeFigureOut">
               <a:rPr lang="en-US" smtClean="0"/>
-              <a:t>4/11/2021</a:t>
+              <a:t>12/22/2021</a:t>
             </a:fld>
             <a:endParaRPr lang="en-US"/>
           </a:p>
@@ -1956,7 +1956,7 @@
           <a:p>
             <a:fld id="{43C63E5C-259F-4767-9F32-E9A25171A77E}" type="datetimeFigureOut">
               <a:rPr lang="en-US" smtClean="0"/>
-              <a:t>4/11/2021</a:t>
+              <a:t>12/22/2021</a:t>
             </a:fld>
             <a:endParaRPr lang="en-US"/>
           </a:p>
@@ -2069,7 +2069,7 @@
           <a:p>
             <a:fld id="{43C63E5C-259F-4767-9F32-E9A25171A77E}" type="datetimeFigureOut">
               <a:rPr lang="en-US" smtClean="0"/>
-              <a:t>4/11/2021</a:t>
+              <a:t>12/22/2021</a:t>
             </a:fld>
             <a:endParaRPr lang="en-US"/>
           </a:p>
@@ -2380,7 +2380,7 @@
           <a:p>
             <a:fld id="{43C63E5C-259F-4767-9F32-E9A25171A77E}" type="datetimeFigureOut">
               <a:rPr lang="en-US" smtClean="0"/>
-              <a:t>4/11/2021</a:t>
+              <a:t>12/22/2021</a:t>
             </a:fld>
             <a:endParaRPr lang="en-US"/>
           </a:p>
@@ -2668,7 +2668,7 @@
           <a:p>
             <a:fld id="{43C63E5C-259F-4767-9F32-E9A25171A77E}" type="datetimeFigureOut">
               <a:rPr lang="en-US" smtClean="0"/>
-              <a:t>4/11/2021</a:t>
+              <a:t>12/22/2021</a:t>
             </a:fld>
             <a:endParaRPr lang="en-US"/>
           </a:p>
@@ -2909,7 +2909,7 @@
           <a:p>
             <a:fld id="{43C63E5C-259F-4767-9F32-E9A25171A77E}" type="datetimeFigureOut">
               <a:rPr lang="en-US" smtClean="0"/>
-              <a:t>4/11/2021</a:t>
+              <a:t>12/22/2021</a:t>
             </a:fld>
             <a:endParaRPr lang="en-US"/>
           </a:p>
@@ -3340,7 +3340,7 @@
         </p:nvSpPr>
         <p:spPr>
           <a:xfrm>
-            <a:off x="7737046" y="6400296"/>
+            <a:off x="7743224" y="6379800"/>
             <a:ext cx="182880" cy="182880"/>
           </a:xfrm>
           <a:prstGeom prst="ellipse">
@@ -3396,7 +3396,7 @@
         </p:nvCxnSpPr>
         <p:spPr>
           <a:xfrm>
-            <a:off x="4351139" y="6479769"/>
+            <a:off x="4357317" y="6459273"/>
             <a:ext cx="3383280" cy="0"/>
           </a:xfrm>
           <a:prstGeom prst="straightConnector1">
@@ -3441,7 +3441,7 @@
         </p:nvCxnSpPr>
         <p:spPr>
           <a:xfrm>
-            <a:off x="2968301" y="594932"/>
+            <a:off x="2968301" y="903852"/>
             <a:ext cx="5394960" cy="0"/>
           </a:xfrm>
           <a:prstGeom prst="straightConnector1">
@@ -3487,7 +3487,7 @@
         </p:nvCxnSpPr>
         <p:spPr>
           <a:xfrm>
-            <a:off x="4258382" y="527758"/>
+            <a:off x="4258382" y="836678"/>
             <a:ext cx="0" cy="163430"/>
           </a:xfrm>
           <a:prstGeom prst="straightConnector1">
@@ -3532,7 +3532,7 @@
         </p:nvCxnSpPr>
         <p:spPr>
           <a:xfrm>
-            <a:off x="7853891" y="513217"/>
+            <a:off x="7853891" y="822137"/>
             <a:ext cx="0" cy="163430"/>
           </a:xfrm>
           <a:prstGeom prst="straightConnector1">
@@ -3575,7 +3575,7 @@
         </p:nvSpPr>
         <p:spPr>
           <a:xfrm>
-            <a:off x="3777556" y="56588"/>
+            <a:off x="3777556" y="365508"/>
             <a:ext cx="1010324" cy="523220"/>
           </a:xfrm>
           <a:prstGeom prst="rect">
@@ -3611,7 +3611,7 @@
         </p:nvSpPr>
         <p:spPr>
           <a:xfrm>
-            <a:off x="7565150" y="45570"/>
+            <a:off x="7565150" y="354490"/>
             <a:ext cx="602439" cy="523220"/>
           </a:xfrm>
           <a:prstGeom prst="rect">
@@ -3647,7 +3647,7 @@
         </p:nvSpPr>
         <p:spPr>
           <a:xfrm>
-            <a:off x="4142909" y="6388329"/>
+            <a:off x="4149087" y="6367833"/>
             <a:ext cx="182880" cy="182880"/>
           </a:xfrm>
           <a:prstGeom prst="ellipse">
@@ -3690,8 +3690,8 @@
           </a:p>
         </p:txBody>
       </p:sp>
-      <mc:AlternateContent xmlns:mc="http://schemas.openxmlformats.org/markup-compatibility/2006" xmlns:a14="http://schemas.microsoft.com/office/drawing/2010/main">
-        <mc:Choice Requires="a14">
+      <mc:AlternateContent xmlns:mc="http://schemas.openxmlformats.org/markup-compatibility/2006">
+        <mc:Choice xmlns:a14="http://schemas.microsoft.com/office/drawing/2010/main" Requires="a14">
           <p:sp>
             <p:nvSpPr>
               <p:cNvPr id="3" name="TextBox 2">
@@ -3706,7 +3706,7 @@
             </p:nvSpPr>
             <p:spPr>
               <a:xfrm>
-                <a:off x="8025679" y="6242291"/>
+                <a:off x="8031857" y="6221795"/>
                 <a:ext cx="1165694" cy="430887"/>
               </a:xfrm>
               <a:prstGeom prst="rect">
@@ -3791,7 +3791,7 @@
             </p:txBody>
           </p:sp>
         </mc:Choice>
-        <mc:Fallback xmlns="">
+        <mc:Fallback>
           <p:sp>
             <p:nvSpPr>
               <p:cNvPr id="3" name="TextBox 2">
@@ -3808,7 +3808,7 @@
             </p:nvSpPr>
             <p:spPr>
               <a:xfrm>
-                <a:off x="8025679" y="6242291"/>
+                <a:off x="8031857" y="6221795"/>
                 <a:ext cx="1165694" cy="430887"/>
               </a:xfrm>
               <a:prstGeom prst="rect">
@@ -3836,8 +3836,8 @@
           </p:sp>
         </mc:Fallback>
       </mc:AlternateContent>
-      <mc:AlternateContent xmlns:mc="http://schemas.openxmlformats.org/markup-compatibility/2006" xmlns:a14="http://schemas.microsoft.com/office/drawing/2010/main">
-        <mc:Choice Requires="a14">
+      <mc:AlternateContent xmlns:mc="http://schemas.openxmlformats.org/markup-compatibility/2006">
+        <mc:Choice xmlns:a14="http://schemas.microsoft.com/office/drawing/2010/main" Requires="a14">
           <p:sp>
             <p:nvSpPr>
               <p:cNvPr id="27" name="TextBox 26">
@@ -3852,7 +3852,7 @@
             </p:nvSpPr>
             <p:spPr>
               <a:xfrm>
-                <a:off x="3412821" y="6242290"/>
+                <a:off x="3418999" y="6221794"/>
                 <a:ext cx="632380" cy="430887"/>
               </a:xfrm>
               <a:prstGeom prst="rect">
@@ -3912,7 +3912,7 @@
             </p:txBody>
           </p:sp>
         </mc:Choice>
-        <mc:Fallback xmlns="">
+        <mc:Fallback>
           <p:sp>
             <p:nvSpPr>
               <p:cNvPr id="27" name="TextBox 26">
@@ -3929,7 +3929,7 @@
             </p:nvSpPr>
             <p:spPr>
               <a:xfrm>
-                <a:off x="3412821" y="6242290"/>
+                <a:off x="3418999" y="6221794"/>
                 <a:ext cx="632380" cy="430887"/>
               </a:xfrm>
               <a:prstGeom prst="rect">
@@ -3973,7 +3973,7 @@
         </p:nvCxnSpPr>
         <p:spPr>
           <a:xfrm>
-            <a:off x="5625515" y="521134"/>
+            <a:off x="5625515" y="830054"/>
             <a:ext cx="0" cy="163430"/>
           </a:xfrm>
           <a:prstGeom prst="straightConnector1">
@@ -4016,8 +4016,8 @@
         </p:nvSpPr>
         <p:spPr>
           <a:xfrm>
-            <a:off x="5131437" y="52199"/>
-            <a:ext cx="1010324" cy="523220"/>
+            <a:off x="4785277" y="361119"/>
+            <a:ext cx="1685315" cy="523220"/>
           </a:xfrm>
           <a:prstGeom prst="rect">
             <a:avLst/>
@@ -4033,7 +4033,7 @@
             <a:pPr algn="ctr"/>
             <a:r>
               <a:rPr lang="en-US" sz="2800" i="1" dirty="0"/>
-              <a:t>t</a:t>
+              <a:t>0 ≤ t ≤ 1</a:t>
             </a:r>
           </a:p>
         </p:txBody>
@@ -4052,7 +4052,7 @@
         </p:nvSpPr>
         <p:spPr>
           <a:xfrm>
-            <a:off x="7750763" y="2272777"/>
+            <a:off x="7750763" y="2690919"/>
             <a:ext cx="182880" cy="182880"/>
           </a:xfrm>
           <a:prstGeom prst="ellipse">
@@ -4108,7 +4108,7 @@
         </p:nvCxnSpPr>
         <p:spPr>
           <a:xfrm>
-            <a:off x="4362159" y="2341233"/>
+            <a:off x="4349803" y="2777909"/>
             <a:ext cx="3383280" cy="0"/>
           </a:xfrm>
           <a:prstGeom prst="straightConnector1">
@@ -4151,7 +4151,7 @@
         </p:nvSpPr>
         <p:spPr>
           <a:xfrm>
-            <a:off x="4142909" y="2260810"/>
+            <a:off x="4142909" y="2685130"/>
             <a:ext cx="182880" cy="182880"/>
           </a:xfrm>
           <a:prstGeom prst="ellipse">
@@ -4194,8 +4194,8 @@
           </a:p>
         </p:txBody>
       </p:sp>
-      <mc:AlternateContent xmlns:mc="http://schemas.openxmlformats.org/markup-compatibility/2006" xmlns:a14="http://schemas.microsoft.com/office/drawing/2010/main">
-        <mc:Choice Requires="a14">
+      <mc:AlternateContent xmlns:mc="http://schemas.openxmlformats.org/markup-compatibility/2006">
+        <mc:Choice xmlns:a14="http://schemas.microsoft.com/office/drawing/2010/main" Requires="a14">
           <p:sp>
             <p:nvSpPr>
               <p:cNvPr id="34" name="TextBox 33">
@@ -4210,7 +4210,7 @@
             </p:nvSpPr>
             <p:spPr>
               <a:xfrm>
-                <a:off x="9652596" y="2121844"/>
+                <a:off x="8024161" y="2554008"/>
                 <a:ext cx="2173263" cy="430887"/>
               </a:xfrm>
               <a:prstGeom prst="rect">
@@ -4231,6 +4231,31 @@
                       <m:jc m:val="centerGroup"/>
                     </m:oMathParaPr>
                     <m:oMath xmlns:m="http://schemas.openxmlformats.org/officeDocument/2006/math">
+                      <m:sSup>
+                        <m:sSupPr>
+                          <m:ctrlPr>
+                            <a:rPr lang="en-US" sz="2800" i="1">
+                              <a:latin typeface="Cambria Math" panose="02040503050406030204" pitchFamily="18" charset="0"/>
+                            </a:rPr>
+                          </m:ctrlPr>
+                        </m:sSupPr>
+                        <m:e>
+                          <m:r>
+                            <a:rPr lang="en-US" sz="2800" i="1">
+                              <a:latin typeface="Cambria Math" panose="02040503050406030204" pitchFamily="18" charset="0"/>
+                            </a:rPr>
+                            <m:t>𝑒</m:t>
+                          </m:r>
+                        </m:e>
+                        <m:sup>
+                          <m:r>
+                            <a:rPr lang="en-US" sz="2800" i="1">
+                              <a:latin typeface="Cambria Math" panose="02040503050406030204" pitchFamily="18" charset="0"/>
+                            </a:rPr>
+                            <m:t>𝑟</m:t>
+                          </m:r>
+                        </m:sup>
+                      </m:sSup>
                       <m:d>
                         <m:dPr>
                           <m:ctrlPr>
@@ -4311,31 +4336,6 @@
                           </m:r>
                         </m:e>
                       </m:d>
-                      <m:sSup>
-                        <m:sSupPr>
-                          <m:ctrlPr>
-                            <a:rPr lang="en-US" sz="2800" i="1" smtClean="0">
-                              <a:latin typeface="Cambria Math" panose="02040503050406030204" pitchFamily="18" charset="0"/>
-                            </a:rPr>
-                          </m:ctrlPr>
-                        </m:sSupPr>
-                        <m:e>
-                          <m:r>
-                            <a:rPr lang="en-US" sz="2800" b="0" i="1" smtClean="0">
-                              <a:latin typeface="Cambria Math" panose="02040503050406030204" pitchFamily="18" charset="0"/>
-                            </a:rPr>
-                            <m:t>𝑒</m:t>
-                          </m:r>
-                        </m:e>
-                        <m:sup>
-                          <m:r>
-                            <a:rPr lang="en-US" sz="2800" b="0" i="1" smtClean="0">
-                              <a:latin typeface="Cambria Math" panose="02040503050406030204" pitchFamily="18" charset="0"/>
-                            </a:rPr>
-                            <m:t>𝑟</m:t>
-                          </m:r>
-                        </m:sup>
-                      </m:sSup>
                     </m:oMath>
                   </m:oMathPara>
                 </a14:m>
@@ -4344,7 +4344,7 @@
             </p:txBody>
           </p:sp>
         </mc:Choice>
-        <mc:Fallback xmlns="">
+        <mc:Fallback>
           <p:sp>
             <p:nvSpPr>
               <p:cNvPr id="34" name="TextBox 33">
@@ -4361,7 +4361,7 @@
             </p:nvSpPr>
             <p:spPr>
               <a:xfrm>
-                <a:off x="9652596" y="2121844"/>
+                <a:off x="8024161" y="2554008"/>
                 <a:ext cx="2173263" cy="430887"/>
               </a:xfrm>
               <a:prstGeom prst="rect">
@@ -4389,8 +4389,8 @@
           </p:sp>
         </mc:Fallback>
       </mc:AlternateContent>
-      <mc:AlternateContent xmlns:mc="http://schemas.openxmlformats.org/markup-compatibility/2006" xmlns:a14="http://schemas.microsoft.com/office/drawing/2010/main">
-        <mc:Choice Requires="a14">
+      <mc:AlternateContent xmlns:mc="http://schemas.openxmlformats.org/markup-compatibility/2006">
+        <mc:Choice xmlns:a14="http://schemas.microsoft.com/office/drawing/2010/main" Requires="a14">
           <p:sp>
             <p:nvSpPr>
               <p:cNvPr id="35" name="TextBox 34">
@@ -4405,7 +4405,7 @@
             </p:nvSpPr>
             <p:spPr>
               <a:xfrm>
-                <a:off x="2620591" y="2103672"/>
+                <a:off x="2620591" y="2527992"/>
                 <a:ext cx="1456057" cy="430887"/>
               </a:xfrm>
               <a:prstGeom prst="rect">
@@ -4429,7 +4429,7 @@
                       <m:sSub>
                         <m:sSubPr>
                           <m:ctrlPr>
-                            <a:rPr lang="en-US" sz="2800" i="1">
+                            <a:rPr lang="en-US" sz="2800" i="1" smtClean="0">
                               <a:latin typeface="Cambria Math" panose="02040503050406030204" pitchFamily="18" charset="0"/>
                             </a:rPr>
                           </m:ctrlPr>
@@ -4455,7 +4455,7 @@
                         </m:sub>
                       </m:sSub>
                       <m:r>
-                        <a:rPr lang="en-US" sz="2800" i="1">
+                        <a:rPr lang="en-US" sz="2800" b="0" i="1" smtClean="0">
                           <a:latin typeface="Cambria Math" panose="02040503050406030204" pitchFamily="18" charset="0"/>
                         </a:rPr>
                         <m:t>−</m:t>
@@ -4496,7 +4496,7 @@
             </p:txBody>
           </p:sp>
         </mc:Choice>
-        <mc:Fallback xmlns="">
+        <mc:Fallback>
           <p:sp>
             <p:nvSpPr>
               <p:cNvPr id="35" name="TextBox 34">
@@ -4513,7 +4513,7 @@
             </p:nvSpPr>
             <p:spPr>
               <a:xfrm>
-                <a:off x="2620591" y="2103672"/>
+                <a:off x="2620591" y="2527992"/>
                 <a:ext cx="1456057" cy="430887"/>
               </a:xfrm>
               <a:prstGeom prst="rect">
@@ -4555,7 +4555,7 @@
         </p:nvSpPr>
         <p:spPr>
           <a:xfrm>
-            <a:off x="593359" y="6169463"/>
+            <a:off x="1726880" y="6200726"/>
             <a:ext cx="1345732" cy="461665"/>
           </a:xfrm>
           <a:prstGeom prst="rect">
@@ -4569,7 +4569,7 @@
           </a:bodyPr>
           <a:lstStyle/>
           <a:p>
-            <a:pPr algn="ctr"/>
+            <a:pPr algn="r"/>
             <a:r>
               <a:rPr lang="en-US" sz="2400" i="1" dirty="0"/>
               <a:t>borrow</a:t>
@@ -4591,7 +4591,7 @@
         </p:nvSpPr>
         <p:spPr>
           <a:xfrm>
-            <a:off x="214301" y="2104318"/>
+            <a:off x="319582" y="2527992"/>
             <a:ext cx="2210023" cy="461665"/>
           </a:xfrm>
           <a:prstGeom prst="rect">
@@ -4605,7 +4605,7 @@
           </a:bodyPr>
           <a:lstStyle/>
           <a:p>
-            <a:pPr algn="ctr"/>
+            <a:pPr algn="r"/>
             <a:r>
               <a:rPr lang="en-US" sz="2400" i="1" dirty="0"/>
               <a:t>invest – borrow</a:t>
@@ -4627,7 +4627,7 @@
         </p:nvSpPr>
         <p:spPr>
           <a:xfrm>
-            <a:off x="7757391" y="2995017"/>
+            <a:off x="7751213" y="3376091"/>
             <a:ext cx="182880" cy="182880"/>
           </a:xfrm>
           <a:prstGeom prst="ellipse">
@@ -4683,7 +4683,7 @@
         </p:nvCxnSpPr>
         <p:spPr>
           <a:xfrm>
-            <a:off x="4357769" y="3074490"/>
+            <a:off x="4357769" y="3461742"/>
             <a:ext cx="3383280" cy="0"/>
           </a:xfrm>
           <a:prstGeom prst="straightConnector1">
@@ -4726,7 +4726,7 @@
         </p:nvSpPr>
         <p:spPr>
           <a:xfrm>
-            <a:off x="4149537" y="2983050"/>
+            <a:off x="4149537" y="3370302"/>
             <a:ext cx="182880" cy="182880"/>
           </a:xfrm>
           <a:prstGeom prst="ellipse">
@@ -4785,7 +4785,7 @@
             </p:nvSpPr>
             <p:spPr>
               <a:xfrm>
-                <a:off x="9645162" y="2857336"/>
+                <a:off x="8105805" y="3212694"/>
                 <a:ext cx="2372854" cy="430887"/>
               </a:xfrm>
               <a:prstGeom prst="rect">
@@ -4891,7 +4891,7 @@
             </p:nvSpPr>
             <p:spPr>
               <a:xfrm>
-                <a:off x="9645162" y="2857336"/>
+                <a:off x="8105805" y="3212694"/>
                 <a:ext cx="2372854" cy="430887"/>
               </a:xfrm>
               <a:prstGeom prst="rect">
@@ -4919,8 +4919,8 @@
           </p:sp>
         </mc:Fallback>
       </mc:AlternateContent>
-      <mc:AlternateContent xmlns:mc="http://schemas.openxmlformats.org/markup-compatibility/2006" xmlns:a14="http://schemas.microsoft.com/office/drawing/2010/main">
-        <mc:Choice Requires="a14">
+      <mc:AlternateContent xmlns:mc="http://schemas.openxmlformats.org/markup-compatibility/2006">
+        <mc:Choice xmlns:a14="http://schemas.microsoft.com/office/drawing/2010/main" Requires="a14">
           <p:sp>
             <p:nvSpPr>
               <p:cNvPr id="45" name="TextBox 44">
@@ -4935,7 +4935,7 @@
             </p:nvSpPr>
             <p:spPr>
               <a:xfrm>
-                <a:off x="3412821" y="2839164"/>
+                <a:off x="3412821" y="3226416"/>
                 <a:ext cx="736715" cy="430887"/>
               </a:xfrm>
               <a:prstGeom prst="rect">
@@ -4992,7 +4992,7 @@
             </p:txBody>
           </p:sp>
         </mc:Choice>
-        <mc:Fallback xmlns="">
+        <mc:Fallback>
           <p:sp>
             <p:nvSpPr>
               <p:cNvPr id="45" name="TextBox 44">
@@ -5009,7 +5009,7 @@
             </p:nvSpPr>
             <p:spPr>
               <a:xfrm>
-                <a:off x="3412821" y="2839164"/>
+                <a:off x="3412821" y="3226416"/>
                 <a:ext cx="736715" cy="430887"/>
               </a:xfrm>
               <a:prstGeom prst="rect">
@@ -5051,7 +5051,7 @@
         </p:nvSpPr>
         <p:spPr>
           <a:xfrm>
-            <a:off x="324142" y="2852416"/>
+            <a:off x="1063755" y="3235939"/>
             <a:ext cx="1990340" cy="461665"/>
           </a:xfrm>
           <a:prstGeom prst="rect">
@@ -5065,7 +5065,7 @@
           </a:bodyPr>
           <a:lstStyle/>
           <a:p>
-            <a:pPr algn="ctr"/>
+            <a:pPr algn="r"/>
             <a:r>
               <a:rPr lang="en-US" sz="2400" i="1" dirty="0"/>
               <a:t>buy EUR call</a:t>
@@ -5087,7 +5087,7 @@
         </p:nvSpPr>
         <p:spPr>
           <a:xfrm>
-            <a:off x="264796" y="3587251"/>
+            <a:off x="1018875" y="4047712"/>
             <a:ext cx="1990340" cy="461665"/>
           </a:xfrm>
           <a:prstGeom prst="rect">
@@ -5101,7 +5101,7 @@
           </a:bodyPr>
           <a:lstStyle/>
           <a:p>
-            <a:pPr algn="ctr"/>
+            <a:pPr algn="r"/>
             <a:r>
               <a:rPr lang="en-US" sz="2400" i="1" dirty="0"/>
               <a:t>write AM call</a:t>
@@ -5123,7 +5123,7 @@
         </p:nvSpPr>
         <p:spPr>
           <a:xfrm>
-            <a:off x="5524041" y="3756607"/>
+            <a:off x="5517863" y="4187105"/>
             <a:ext cx="182880" cy="182880"/>
           </a:xfrm>
           <a:prstGeom prst="ellipse">
@@ -5179,8 +5179,8 @@
         </p:nvCxnSpPr>
         <p:spPr>
           <a:xfrm>
-            <a:off x="4369147" y="3849332"/>
-            <a:ext cx="1124712" cy="0"/>
+            <a:off x="4363947" y="4278544"/>
+            <a:ext cx="1152000" cy="0"/>
           </a:xfrm>
           <a:prstGeom prst="straightConnector1">
             <a:avLst/>
@@ -5222,7 +5222,7 @@
         </p:nvSpPr>
         <p:spPr>
           <a:xfrm>
-            <a:off x="4160913" y="3757892"/>
+            <a:off x="4160913" y="4188390"/>
             <a:ext cx="182880" cy="182880"/>
           </a:xfrm>
           <a:prstGeom prst="ellipse">
@@ -5265,8 +5265,8 @@
           </a:p>
         </p:txBody>
       </p:sp>
-      <mc:AlternateContent xmlns:mc="http://schemas.openxmlformats.org/markup-compatibility/2006" xmlns:a14="http://schemas.microsoft.com/office/drawing/2010/main">
-        <mc:Choice Requires="a14">
+      <mc:AlternateContent xmlns:mc="http://schemas.openxmlformats.org/markup-compatibility/2006">
+        <mc:Choice xmlns:a14="http://schemas.microsoft.com/office/drawing/2010/main" Requires="a14">
           <p:sp>
             <p:nvSpPr>
               <p:cNvPr id="52" name="TextBox 51">
@@ -5281,7 +5281,7 @@
             </p:nvSpPr>
             <p:spPr>
               <a:xfrm>
-                <a:off x="3306524" y="3589389"/>
+                <a:off x="3306524" y="4019887"/>
                 <a:ext cx="736715" cy="430887"/>
               </a:xfrm>
               <a:prstGeom prst="rect">
@@ -5344,7 +5344,7 @@
             </p:txBody>
           </p:sp>
         </mc:Choice>
-        <mc:Fallback xmlns="">
+        <mc:Fallback>
           <p:sp>
             <p:nvSpPr>
               <p:cNvPr id="52" name="TextBox 51">
@@ -5361,7 +5361,7 @@
             </p:nvSpPr>
             <p:spPr>
               <a:xfrm>
-                <a:off x="3306524" y="3589389"/>
+                <a:off x="3306524" y="4019887"/>
                 <a:ext cx="736715" cy="430887"/>
               </a:xfrm>
               <a:prstGeom prst="rect">
@@ -5391,10 +5391,10 @@
       </mc:AlternateContent>
       <p:sp>
         <p:nvSpPr>
-          <p:cNvPr id="54" name="TextBox 53">
-            <a:extLst>
-              <a:ext uri="{FF2B5EF4-FFF2-40B4-BE49-F238E27FC236}">
-                <a16:creationId xmlns:a16="http://schemas.microsoft.com/office/drawing/2014/main" id="{DD75AC3F-50E7-423E-B516-B5BE78C8D120}"/>
+          <p:cNvPr id="55" name="TextBox 54">
+            <a:extLst>
+              <a:ext uri="{FF2B5EF4-FFF2-40B4-BE49-F238E27FC236}">
+                <a16:creationId xmlns:a16="http://schemas.microsoft.com/office/drawing/2014/main" id="{8C98941A-4CBE-473F-95F5-F681D303D3FF}"/>
               </a:ext>
             </a:extLst>
           </p:cNvPr>
@@ -5403,43 +5403,7 @@
         </p:nvSpPr>
         <p:spPr>
           <a:xfrm>
-            <a:off x="4828643" y="3259222"/>
-            <a:ext cx="1489382" cy="461665"/>
-          </a:xfrm>
-          <a:prstGeom prst="rect">
-            <a:avLst/>
-          </a:prstGeom>
-          <a:noFill/>
-        </p:spPr>
-        <p:txBody>
-          <a:bodyPr wrap="square" rtlCol="0">
-            <a:spAutoFit/>
-          </a:bodyPr>
-          <a:lstStyle/>
-          <a:p>
-            <a:pPr algn="ctr"/>
-            <a:r>
-              <a:rPr lang="en-US" sz="2400" i="1" dirty="0"/>
-              <a:t>exercised</a:t>
-            </a:r>
-          </a:p>
-        </p:txBody>
-      </p:sp>
-      <p:sp>
-        <p:nvSpPr>
-          <p:cNvPr id="55" name="TextBox 54">
-            <a:extLst>
-              <a:ext uri="{FF2B5EF4-FFF2-40B4-BE49-F238E27FC236}">
-                <a16:creationId xmlns:a16="http://schemas.microsoft.com/office/drawing/2014/main" id="{8C98941A-4CBE-473F-95F5-F681D303D3FF}"/>
-              </a:ext>
-            </a:extLst>
-          </p:cNvPr>
-          <p:cNvSpPr txBox="1"/>
-          <p:nvPr/>
-        </p:nvSpPr>
-        <p:spPr>
-          <a:xfrm>
-            <a:off x="444153" y="4556001"/>
+            <a:off x="1753748" y="4852217"/>
             <a:ext cx="1631625" cy="461665"/>
           </a:xfrm>
           <a:prstGeom prst="rect">
@@ -5453,7 +5417,7 @@
           </a:bodyPr>
           <a:lstStyle/>
           <a:p>
-            <a:pPr algn="ctr"/>
+            <a:pPr algn="r"/>
             <a:r>
               <a:rPr lang="en-US" sz="2400" i="1" dirty="0"/>
               <a:t>buy 1 stock</a:t>
@@ -5475,7 +5439,7 @@
         </p:nvSpPr>
         <p:spPr>
           <a:xfrm>
-            <a:off x="5511914" y="4692903"/>
+            <a:off x="5511914" y="4981307"/>
             <a:ext cx="182880" cy="182880"/>
           </a:xfrm>
           <a:prstGeom prst="ellipse">
@@ -5531,7 +5495,7 @@
         </p:nvCxnSpPr>
         <p:spPr>
           <a:xfrm>
-            <a:off x="4392304" y="4785628"/>
+            <a:off x="4383544" y="5072746"/>
             <a:ext cx="1115568" cy="0"/>
           </a:xfrm>
           <a:prstGeom prst="straightConnector1">
@@ -5574,7 +5538,7 @@
         </p:nvSpPr>
         <p:spPr>
           <a:xfrm>
-            <a:off x="4170820" y="4694188"/>
+            <a:off x="4170820" y="4982592"/>
             <a:ext cx="182880" cy="182880"/>
           </a:xfrm>
           <a:prstGeom prst="ellipse">
@@ -5617,8 +5581,8 @@
           </a:p>
         </p:txBody>
       </p:sp>
-      <mc:AlternateContent xmlns:mc="http://schemas.openxmlformats.org/markup-compatibility/2006" xmlns:a14="http://schemas.microsoft.com/office/drawing/2010/main">
-        <mc:Choice Requires="a14">
+      <mc:AlternateContent xmlns:mc="http://schemas.openxmlformats.org/markup-compatibility/2006">
+        <mc:Choice xmlns:a14="http://schemas.microsoft.com/office/drawing/2010/main" Requires="a14">
           <p:sp>
             <p:nvSpPr>
               <p:cNvPr id="61" name="TextBox 60">
@@ -5633,7 +5597,7 @@
             </p:nvSpPr>
             <p:spPr>
               <a:xfrm>
-                <a:off x="3510528" y="4545279"/>
+                <a:off x="3510528" y="4846039"/>
                 <a:ext cx="632380" cy="430887"/>
               </a:xfrm>
               <a:prstGeom prst="rect">
@@ -5687,7 +5651,7 @@
             </p:txBody>
           </p:sp>
         </mc:Choice>
-        <mc:Fallback xmlns="">
+        <mc:Fallback>
           <p:sp>
             <p:nvSpPr>
               <p:cNvPr id="61" name="TextBox 60">
@@ -5704,7 +5668,7 @@
             </p:nvSpPr>
             <p:spPr>
               <a:xfrm>
-                <a:off x="3510528" y="4545279"/>
+                <a:off x="3510528" y="4846039"/>
                 <a:ext cx="632380" cy="430887"/>
               </a:xfrm>
               <a:prstGeom prst="rect">
@@ -5748,8 +5712,8 @@
         </p:nvCxnSpPr>
         <p:spPr>
           <a:xfrm flipV="1">
-            <a:off x="5602167" y="3972898"/>
-            <a:ext cx="0" cy="667512"/>
+            <a:off x="5602167" y="4391040"/>
+            <a:ext cx="0" cy="576000"/>
           </a:xfrm>
           <a:prstGeom prst="straightConnector1">
             <a:avLst/>
@@ -5777,8 +5741,8 @@
           </a:fontRef>
         </p:style>
       </p:cxnSp>
-      <mc:AlternateContent xmlns:mc="http://schemas.openxmlformats.org/markup-compatibility/2006" xmlns:a14="http://schemas.microsoft.com/office/drawing/2010/main">
-        <mc:Choice Requires="a14">
+      <mc:AlternateContent xmlns:mc="http://schemas.openxmlformats.org/markup-compatibility/2006">
+        <mc:Choice xmlns:a14="http://schemas.microsoft.com/office/drawing/2010/main" Requires="a14">
           <p:sp>
             <p:nvSpPr>
               <p:cNvPr id="63" name="TextBox 62">
@@ -5793,7 +5757,7 @@
             </p:nvSpPr>
             <p:spPr>
               <a:xfrm>
-                <a:off x="5685087" y="4096375"/>
+                <a:off x="5676712" y="4569258"/>
                 <a:ext cx="1561289" cy="430887"/>
               </a:xfrm>
               <a:prstGeom prst="rect">
@@ -5857,7 +5821,7 @@
             </p:txBody>
           </p:sp>
         </mc:Choice>
-        <mc:Fallback xmlns="">
+        <mc:Fallback>
           <p:sp>
             <p:nvSpPr>
               <p:cNvPr id="63" name="TextBox 62">
@@ -5874,7 +5838,7 @@
             </p:nvSpPr>
             <p:spPr>
               <a:xfrm>
-                <a:off x="5685087" y="4096375"/>
+                <a:off x="5676712" y="4569258"/>
                 <a:ext cx="1561289" cy="430887"/>
               </a:xfrm>
               <a:prstGeom prst="rect">
@@ -5918,7 +5882,7 @@
         </p:nvCxnSpPr>
         <p:spPr>
           <a:xfrm>
-            <a:off x="5722042" y="5772913"/>
+            <a:off x="5722520" y="5896062"/>
             <a:ext cx="2011680" cy="0"/>
           </a:xfrm>
           <a:prstGeom prst="straightConnector1">
@@ -5961,7 +5925,7 @@
         </p:nvSpPr>
         <p:spPr>
           <a:xfrm>
-            <a:off x="5505290" y="5680192"/>
+            <a:off x="5511468" y="5807968"/>
             <a:ext cx="182880" cy="182880"/>
           </a:xfrm>
           <a:prstGeom prst="ellipse">
@@ -6001,8 +5965,8 @@
           </a:p>
         </p:txBody>
       </p:sp>
-      <mc:AlternateContent xmlns:mc="http://schemas.openxmlformats.org/markup-compatibility/2006" xmlns:a14="http://schemas.microsoft.com/office/drawing/2010/main">
-        <mc:Choice Requires="a14">
+      <mc:AlternateContent xmlns:mc="http://schemas.openxmlformats.org/markup-compatibility/2006">
+        <mc:Choice xmlns:a14="http://schemas.microsoft.com/office/drawing/2010/main" Requires="a14">
           <p:sp>
             <p:nvSpPr>
               <p:cNvPr id="66" name="TextBox 65">
@@ -6017,7 +5981,7 @@
             </p:nvSpPr>
             <p:spPr>
               <a:xfrm>
-                <a:off x="5607248" y="5085112"/>
+                <a:off x="5621888" y="5233568"/>
                 <a:ext cx="632381" cy="430887"/>
               </a:xfrm>
               <a:prstGeom prst="rect">
@@ -6052,7 +6016,7 @@
             </p:txBody>
           </p:sp>
         </mc:Choice>
-        <mc:Fallback xmlns="">
+        <mc:Fallback>
           <p:sp>
             <p:nvSpPr>
               <p:cNvPr id="66" name="TextBox 65">
@@ -6069,7 +6033,7 @@
             </p:nvSpPr>
             <p:spPr>
               <a:xfrm>
-                <a:off x="5607248" y="5085112"/>
+                <a:off x="5621888" y="5233568"/>
                 <a:ext cx="632381" cy="430887"/>
               </a:xfrm>
               <a:prstGeom prst="rect">
@@ -6113,8 +6077,8 @@
         </p:nvCxnSpPr>
         <p:spPr>
           <a:xfrm>
-            <a:off x="5595607" y="4925942"/>
-            <a:ext cx="0" cy="720127"/>
+            <a:off x="5602908" y="5190823"/>
+            <a:ext cx="0" cy="576000"/>
           </a:xfrm>
           <a:prstGeom prst="straightConnector1">
             <a:avLst/>
@@ -6156,7 +6120,7 @@
         </p:nvSpPr>
         <p:spPr>
           <a:xfrm>
-            <a:off x="4497803" y="5501757"/>
+            <a:off x="4503981" y="5629533"/>
             <a:ext cx="1018557" cy="461665"/>
           </a:xfrm>
           <a:prstGeom prst="rect">
@@ -6192,7 +6156,7 @@
         </p:nvSpPr>
         <p:spPr>
           <a:xfrm>
-            <a:off x="7728288" y="5676846"/>
+            <a:off x="7734466" y="5804622"/>
             <a:ext cx="182880" cy="182880"/>
           </a:xfrm>
           <a:prstGeom prst="ellipse">
@@ -6232,8 +6196,8 @@
           </a:p>
         </p:txBody>
       </p:sp>
-      <mc:AlternateContent xmlns:mc="http://schemas.openxmlformats.org/markup-compatibility/2006" xmlns:a14="http://schemas.microsoft.com/office/drawing/2010/main">
-        <mc:Choice Requires="a14">
+      <mc:AlternateContent xmlns:mc="http://schemas.openxmlformats.org/markup-compatibility/2006">
+        <mc:Choice xmlns:a14="http://schemas.microsoft.com/office/drawing/2010/main" Requires="a14">
           <p:sp>
             <p:nvSpPr>
               <p:cNvPr id="70" name="TextBox 69">
@@ -6248,7 +6212,7 @@
             </p:nvSpPr>
             <p:spPr>
               <a:xfrm>
-                <a:off x="7965422" y="5482545"/>
+                <a:off x="7939821" y="5627767"/>
                 <a:ext cx="1583688" cy="448777"/>
               </a:xfrm>
               <a:prstGeom prst="rect">
@@ -6320,7 +6284,7 @@
             </p:txBody>
           </p:sp>
         </mc:Choice>
-        <mc:Fallback xmlns="">
+        <mc:Fallback>
           <p:sp>
             <p:nvSpPr>
               <p:cNvPr id="70" name="TextBox 69">
@@ -6337,7 +6301,7 @@
             </p:nvSpPr>
             <p:spPr>
               <a:xfrm>
-                <a:off x="7965422" y="5482545"/>
+                <a:off x="7939821" y="5627767"/>
                 <a:ext cx="1583688" cy="448777"/>
               </a:xfrm>
               <a:prstGeom prst="rect">
@@ -6365,8 +6329,8 @@
           </p:sp>
         </mc:Fallback>
       </mc:AlternateContent>
-      <mc:AlternateContent xmlns:mc="http://schemas.openxmlformats.org/markup-compatibility/2006" xmlns:a14="http://schemas.microsoft.com/office/drawing/2010/main">
-        <mc:Choice Requires="a14">
+      <mc:AlternateContent xmlns:mc="http://schemas.openxmlformats.org/markup-compatibility/2006">
+        <mc:Choice xmlns:a14="http://schemas.microsoft.com/office/drawing/2010/main" Requires="a14">
           <p:sp>
             <p:nvSpPr>
               <p:cNvPr id="71" name="TextBox 70">
@@ -6381,7 +6345,7 @@
             </p:nvSpPr>
             <p:spPr>
               <a:xfrm>
-                <a:off x="9632829" y="5880748"/>
+                <a:off x="9768745" y="5915853"/>
                 <a:ext cx="2416841" cy="430887"/>
               </a:xfrm>
               <a:prstGeom prst="rect">
@@ -6514,7 +6478,7 @@
             </p:txBody>
           </p:sp>
         </mc:Choice>
-        <mc:Fallback xmlns="">
+        <mc:Fallback>
           <p:sp>
             <p:nvSpPr>
               <p:cNvPr id="71" name="TextBox 70">
@@ -6531,7 +6495,7 @@
             </p:nvSpPr>
             <p:spPr>
               <a:xfrm>
-                <a:off x="9632829" y="5880748"/>
+                <a:off x="9768745" y="5915853"/>
                 <a:ext cx="2416841" cy="430887"/>
               </a:xfrm>
               <a:prstGeom prst="rect">
@@ -6559,52 +6523,6 @@
           </p:sp>
         </mc:Fallback>
       </mc:AlternateContent>
-      <p:cxnSp>
-        <p:nvCxnSpPr>
-          <p:cNvPr id="73" name="Straight Arrow Connector 72">
-            <a:extLst>
-              <a:ext uri="{FF2B5EF4-FFF2-40B4-BE49-F238E27FC236}">
-                <a16:creationId xmlns:a16="http://schemas.microsoft.com/office/drawing/2014/main" id="{885FA8C4-72E1-4E0C-B52E-51CBE993ABE1}"/>
-              </a:ext>
-            </a:extLst>
-          </p:cNvPr>
-          <p:cNvCxnSpPr>
-            <a:cxnSpLocks/>
-          </p:cNvCxnSpPr>
-          <p:nvPr/>
-        </p:nvCxnSpPr>
-        <p:spPr>
-          <a:xfrm flipV="1">
-            <a:off x="9497788" y="2174044"/>
-            <a:ext cx="0" cy="4572000"/>
-          </a:xfrm>
-          <a:prstGeom prst="straightConnector1">
-            <a:avLst/>
-          </a:prstGeom>
-          <a:ln w="9525">
-            <a:solidFill>
-              <a:schemeClr val="tx1"/>
-            </a:solidFill>
-            <a:prstDash val="solid"/>
-            <a:headEnd type="none"/>
-            <a:tailEnd type="none" w="lg" len="lg"/>
-          </a:ln>
-        </p:spPr>
-        <p:style>
-          <a:lnRef idx="1">
-            <a:schemeClr val="accent1"/>
-          </a:lnRef>
-          <a:fillRef idx="0">
-            <a:schemeClr val="accent1"/>
-          </a:fillRef>
-          <a:effectRef idx="0">
-            <a:schemeClr val="accent1"/>
-          </a:effectRef>
-          <a:fontRef idx="minor">
-            <a:schemeClr val="tx1"/>
-          </a:fontRef>
-        </p:style>
-      </p:cxnSp>
       <p:sp>
         <p:nvSpPr>
           <p:cNvPr id="74" name="TextBox 73">
@@ -6619,7 +6537,7 @@
         </p:nvSpPr>
         <p:spPr>
           <a:xfrm>
-            <a:off x="2754845" y="178551"/>
+            <a:off x="2754845" y="487471"/>
             <a:ext cx="981844" cy="461665"/>
           </a:xfrm>
           <a:prstGeom prst="rect">
@@ -6655,7 +6573,7 @@
         </p:nvSpPr>
         <p:spPr>
           <a:xfrm>
-            <a:off x="2730916" y="974567"/>
+            <a:off x="2730916" y="1227885"/>
             <a:ext cx="1345732" cy="461665"/>
           </a:xfrm>
           <a:prstGeom prst="rect">
@@ -6677,8 +6595,8 @@
           </a:p>
         </p:txBody>
       </p:sp>
-      <mc:AlternateContent xmlns:mc="http://schemas.openxmlformats.org/markup-compatibility/2006" xmlns:a14="http://schemas.microsoft.com/office/drawing/2010/main">
-        <mc:Choice Requires="a14">
+      <mc:AlternateContent xmlns:mc="http://schemas.openxmlformats.org/markup-compatibility/2006">
+        <mc:Choice xmlns:a14="http://schemas.microsoft.com/office/drawing/2010/main" Requires="a14">
           <p:sp>
             <p:nvSpPr>
               <p:cNvPr id="77" name="TextBox 76">
@@ -6693,7 +6611,7 @@
             </p:nvSpPr>
             <p:spPr>
               <a:xfrm>
-                <a:off x="3955999" y="1029329"/>
+                <a:off x="3955999" y="1282647"/>
                 <a:ext cx="632380" cy="430887"/>
               </a:xfrm>
               <a:prstGeom prst="rect">
@@ -6728,7 +6646,7 @@
             </p:txBody>
           </p:sp>
         </mc:Choice>
-        <mc:Fallback xmlns="">
+        <mc:Fallback>
           <p:sp>
             <p:nvSpPr>
               <p:cNvPr id="77" name="TextBox 76">
@@ -6745,7 +6663,7 @@
             </p:nvSpPr>
             <p:spPr>
               <a:xfrm>
-                <a:off x="3955999" y="1029329"/>
+                <a:off x="3955999" y="1282647"/>
                 <a:ext cx="632380" cy="430887"/>
               </a:xfrm>
               <a:prstGeom prst="rect">
@@ -6773,8 +6691,8 @@
           </p:sp>
         </mc:Fallback>
       </mc:AlternateContent>
-      <mc:AlternateContent xmlns:mc="http://schemas.openxmlformats.org/markup-compatibility/2006" xmlns:a14="http://schemas.microsoft.com/office/drawing/2010/main">
-        <mc:Choice Requires="a14">
+      <mc:AlternateContent xmlns:mc="http://schemas.openxmlformats.org/markup-compatibility/2006">
+        <mc:Choice xmlns:a14="http://schemas.microsoft.com/office/drawing/2010/main" Requires="a14">
           <p:sp>
             <p:nvSpPr>
               <p:cNvPr id="78" name="TextBox 77">
@@ -6789,7 +6707,7 @@
             </p:nvSpPr>
             <p:spPr>
               <a:xfrm>
-                <a:off x="7539856" y="1013941"/>
+                <a:off x="7539856" y="1267259"/>
                 <a:ext cx="632380" cy="430887"/>
               </a:xfrm>
               <a:prstGeom prst="rect">
@@ -6824,7 +6742,7 @@
             </p:txBody>
           </p:sp>
         </mc:Choice>
-        <mc:Fallback xmlns="">
+        <mc:Fallback>
           <p:sp>
             <p:nvSpPr>
               <p:cNvPr id="78" name="TextBox 77">
@@ -6841,7 +6759,7 @@
             </p:nvSpPr>
             <p:spPr>
               <a:xfrm>
-                <a:off x="7539856" y="1013941"/>
+                <a:off x="7539856" y="1267259"/>
                 <a:ext cx="632380" cy="430887"/>
               </a:xfrm>
               <a:prstGeom prst="rect">
@@ -6885,7 +6803,7 @@
         </p:nvCxnSpPr>
         <p:spPr>
           <a:xfrm>
-            <a:off x="4472901" y="1244772"/>
+            <a:off x="4472901" y="1498090"/>
             <a:ext cx="3200400" cy="0"/>
           </a:xfrm>
           <a:prstGeom prst="straightConnector1">
@@ -6928,7 +6846,7 @@
         </p:nvSpPr>
         <p:spPr>
           <a:xfrm>
-            <a:off x="4588379" y="798496"/>
+            <a:off x="4810801" y="1051814"/>
             <a:ext cx="1823438" cy="461665"/>
           </a:xfrm>
           <a:prstGeom prst="rect">
@@ -6946,6 +6864,164 @@
             <a:r>
               <a:rPr lang="en-US" sz="2400" i="1" dirty="0"/>
               <a:t>no arbitrage</a:t>
+            </a:r>
+          </a:p>
+        </p:txBody>
+      </p:sp>
+      <p:sp>
+        <p:nvSpPr>
+          <p:cNvPr id="59" name="TextBox 58">
+            <a:extLst>
+              <a:ext uri="{FF2B5EF4-FFF2-40B4-BE49-F238E27FC236}">
+                <a16:creationId xmlns:a16="http://schemas.microsoft.com/office/drawing/2014/main" id="{58914864-2252-4146-9B58-7E7A7DCB527B}"/>
+              </a:ext>
+            </a:extLst>
+          </p:cNvPr>
+          <p:cNvSpPr txBox="1"/>
+          <p:nvPr/>
+        </p:nvSpPr>
+        <p:spPr>
+          <a:xfrm>
+            <a:off x="3607504" y="14871"/>
+            <a:ext cx="981844" cy="461665"/>
+          </a:xfrm>
+          <a:prstGeom prst="rect">
+            <a:avLst/>
+          </a:prstGeom>
+          <a:noFill/>
+        </p:spPr>
+        <p:txBody>
+          <a:bodyPr wrap="square" rtlCol="0">
+            <a:spAutoFit/>
+          </a:bodyPr>
+          <a:lstStyle/>
+          <a:p>
+            <a:pPr algn="ctr"/>
+            <a:r>
+              <a:rPr lang="en-US" sz="2400" i="1" dirty="0"/>
+              <a:t>Start</a:t>
+            </a:r>
+          </a:p>
+        </p:txBody>
+      </p:sp>
+      <p:sp>
+        <p:nvSpPr>
+          <p:cNvPr id="72" name="TextBox 71">
+            <a:extLst>
+              <a:ext uri="{FF2B5EF4-FFF2-40B4-BE49-F238E27FC236}">
+                <a16:creationId xmlns:a16="http://schemas.microsoft.com/office/drawing/2014/main" id="{B3D281EE-E812-45B1-893E-5489FCA10A5C}"/>
+              </a:ext>
+            </a:extLst>
+          </p:cNvPr>
+          <p:cNvSpPr txBox="1"/>
+          <p:nvPr/>
+        </p:nvSpPr>
+        <p:spPr>
+          <a:xfrm>
+            <a:off x="7505693" y="20829"/>
+            <a:ext cx="1551818" cy="461665"/>
+          </a:xfrm>
+          <a:prstGeom prst="rect">
+            <a:avLst/>
+          </a:prstGeom>
+          <a:noFill/>
+        </p:spPr>
+        <p:txBody>
+          <a:bodyPr wrap="square" rtlCol="0">
+            <a:spAutoFit/>
+          </a:bodyPr>
+          <a:lstStyle/>
+          <a:p>
+            <a:pPr algn="ctr"/>
+            <a:r>
+              <a:rPr lang="en-US" sz="2400" i="1" dirty="0"/>
+              <a:t>Maturity</a:t>
+            </a:r>
+          </a:p>
+        </p:txBody>
+      </p:sp>
+      <p:sp>
+        <p:nvSpPr>
+          <p:cNvPr id="4" name="Right Brace 3">
+            <a:extLst>
+              <a:ext uri="{FF2B5EF4-FFF2-40B4-BE49-F238E27FC236}">
+                <a16:creationId xmlns:a16="http://schemas.microsoft.com/office/drawing/2014/main" id="{4E19440F-8148-4421-A811-E280F6BB4DCE}"/>
+              </a:ext>
+            </a:extLst>
+          </p:cNvPr>
+          <p:cNvSpPr/>
+          <p:nvPr/>
+        </p:nvSpPr>
+        <p:spPr>
+          <a:xfrm>
+            <a:off x="9417157" y="5603055"/>
+            <a:ext cx="265156" cy="1080516"/>
+          </a:xfrm>
+          <a:prstGeom prst="rightBrace">
+            <a:avLst>
+              <a:gd name="adj1" fmla="val 60583"/>
+              <a:gd name="adj2" fmla="val 50000"/>
+            </a:avLst>
+          </a:prstGeom>
+          <a:ln w="12700" cap="rnd">
+            <a:round/>
+          </a:ln>
+        </p:spPr>
+        <p:style>
+          <a:lnRef idx="1">
+            <a:schemeClr val="accent1"/>
+          </a:lnRef>
+          <a:fillRef idx="0">
+            <a:schemeClr val="accent1"/>
+          </a:fillRef>
+          <a:effectRef idx="0">
+            <a:schemeClr val="accent1"/>
+          </a:effectRef>
+          <a:fontRef idx="minor">
+            <a:schemeClr val="tx1"/>
+          </a:fontRef>
+        </p:style>
+        <p:txBody>
+          <a:bodyPr rtlCol="0" anchor="ctr"/>
+          <a:lstStyle/>
+          <a:p>
+            <a:pPr algn="ctr"/>
+            <a:endParaRPr lang="en-US" dirty="0"/>
+          </a:p>
+        </p:txBody>
+      </p:sp>
+      <p:sp>
+        <p:nvSpPr>
+          <p:cNvPr id="75" name="TextBox 74">
+            <a:extLst>
+              <a:ext uri="{FF2B5EF4-FFF2-40B4-BE49-F238E27FC236}">
+                <a16:creationId xmlns:a16="http://schemas.microsoft.com/office/drawing/2014/main" id="{67F7864E-C9ED-4E63-9F02-9216F8AEBB52}"/>
+              </a:ext>
+            </a:extLst>
+          </p:cNvPr>
+          <p:cNvSpPr txBox="1"/>
+          <p:nvPr/>
+        </p:nvSpPr>
+        <p:spPr>
+          <a:xfrm>
+            <a:off x="4928387" y="22979"/>
+            <a:ext cx="1408346" cy="461665"/>
+          </a:xfrm>
+          <a:prstGeom prst="rect">
+            <a:avLst/>
+          </a:prstGeom>
+          <a:noFill/>
+        </p:spPr>
+        <p:txBody>
+          <a:bodyPr wrap="square" rtlCol="0">
+            <a:spAutoFit/>
+          </a:bodyPr>
+          <a:lstStyle/>
+          <a:p>
+            <a:pPr algn="ctr"/>
+            <a:r>
+              <a:rPr lang="en-US" sz="2400" i="1" dirty="0"/>
+              <a:t>Exercised</a:t>
             </a:r>
           </a:p>
         </p:txBody>

</xml_diff>

<commit_message>
updated am/eur put/call prices
</commit_message>
<xml_diff>
--- a/img/am-call-eur-call.pptx
+++ b/img/am-call-eur-call.pptx
@@ -5712,8 +5712,8 @@
         </p:nvCxnSpPr>
         <p:spPr>
           <a:xfrm flipV="1">
-            <a:off x="5602167" y="4391040"/>
-            <a:ext cx="0" cy="576000"/>
+            <a:off x="5602167" y="4384509"/>
+            <a:ext cx="0" cy="612000"/>
           </a:xfrm>
           <a:prstGeom prst="straightConnector1">
             <a:avLst/>
@@ -5882,7 +5882,7 @@
         </p:nvCxnSpPr>
         <p:spPr>
           <a:xfrm>
-            <a:off x="5722520" y="5896062"/>
+            <a:off x="5715989" y="5896062"/>
             <a:ext cx="2011680" cy="0"/>
           </a:xfrm>
           <a:prstGeom prst="straightConnector1">
@@ -5925,7 +5925,7 @@
         </p:nvSpPr>
         <p:spPr>
           <a:xfrm>
-            <a:off x="5511468" y="5807968"/>
+            <a:off x="5511468" y="5801437"/>
             <a:ext cx="182880" cy="182880"/>
           </a:xfrm>
           <a:prstGeom prst="ellipse">
@@ -6077,8 +6077,8 @@
         </p:nvCxnSpPr>
         <p:spPr>
           <a:xfrm>
-            <a:off x="5602908" y="5190823"/>
-            <a:ext cx="0" cy="576000"/>
+            <a:off x="5602167" y="5170718"/>
+            <a:ext cx="0" cy="612000"/>
           </a:xfrm>
           <a:prstGeom prst="straightConnector1">
             <a:avLst/>
@@ -6120,8 +6120,8 @@
         </p:nvSpPr>
         <p:spPr>
           <a:xfrm>
-            <a:off x="4503981" y="5629533"/>
-            <a:ext cx="1018557" cy="461665"/>
+            <a:off x="4226057" y="5616471"/>
+            <a:ext cx="1270358" cy="461665"/>
           </a:xfrm>
           <a:prstGeom prst="rect">
             <a:avLst/>
@@ -6134,10 +6134,10 @@
           </a:bodyPr>
           <a:lstStyle/>
           <a:p>
-            <a:pPr algn="ctr"/>
+            <a:pPr algn="r"/>
             <a:r>
               <a:rPr lang="en-US" sz="2400" i="1" dirty="0"/>
-              <a:t>invest</a:t>
+              <a:t>invested</a:t>
             </a:r>
           </a:p>
         </p:txBody>
@@ -6156,7 +6156,7 @@
         </p:nvSpPr>
         <p:spPr>
           <a:xfrm>
-            <a:off x="7734466" y="5804622"/>
+            <a:off x="7734466" y="5798091"/>
             <a:ext cx="182880" cy="182880"/>
           </a:xfrm>
           <a:prstGeom prst="ellipse">
@@ -6212,7 +6212,7 @@
             </p:nvSpPr>
             <p:spPr>
               <a:xfrm>
-                <a:off x="7939821" y="5627767"/>
+                <a:off x="7939821" y="5621236"/>
                 <a:ext cx="1583688" cy="448777"/>
               </a:xfrm>
               <a:prstGeom prst="rect">
@@ -6301,7 +6301,7 @@
             </p:nvSpPr>
             <p:spPr>
               <a:xfrm>
-                <a:off x="7939821" y="5627767"/>
+                <a:off x="7939821" y="5621236"/>
                 <a:ext cx="1583688" cy="448777"/>
               </a:xfrm>
               <a:prstGeom prst="rect">
@@ -7022,6 +7022,41 @@
             <a:r>
               <a:rPr lang="en-US" sz="2400" i="1" dirty="0"/>
               <a:t>Exercised</a:t>
+            </a:r>
+          </a:p>
+        </p:txBody>
+      </p:sp>
+      <p:sp>
+        <p:nvSpPr>
+          <p:cNvPr id="81" name="TextBox 80">
+            <a:extLst>
+              <a:ext uri="{FF2B5EF4-FFF2-40B4-BE49-F238E27FC236}">
+                <a16:creationId xmlns:a16="http://schemas.microsoft.com/office/drawing/2014/main" id="{1AD3BAB0-8E98-4A08-8E2A-D8510AA99E2E}"/>
+              </a:ext>
+            </a:extLst>
+          </p:cNvPr>
+          <p:cNvSpPr txBox="1"/>
+          <p:nvPr/>
+        </p:nvSpPr>
+        <p:spPr>
+          <a:xfrm>
+            <a:off x="5609303" y="3755622"/>
+            <a:ext cx="1327442" cy="461665"/>
+          </a:xfrm>
+          <a:prstGeom prst="rect">
+            <a:avLst/>
+          </a:prstGeom>
+          <a:noFill/>
+        </p:spPr>
+        <p:txBody>
+          <a:bodyPr wrap="square" rtlCol="0">
+            <a:spAutoFit/>
+          </a:bodyPr>
+          <a:lstStyle/>
+          <a:p>
+            <a:r>
+              <a:rPr lang="en-US" sz="2400" i="1" dirty="0"/>
+              <a:t>exercised</a:t>
             </a:r>
           </a:p>
         </p:txBody>

</xml_diff>